<commit_message>
Redesign navigation and UI for web interface
Introduces a unified navigation bar across control, download, and visualization pages with improved styling and active state handling via a new navbar.js script. Updates style.css for a modern look, including a new color scheme, enhanced status display, and a logo panel. Minor C++ changes add placeholder for 'set_offset' command and whitespace cleanup.
</commit_message>
<xml_diff>
--- a/web_server/icons_devel.pptx
+++ b/web_server/icons_devel.pptx
@@ -6,6 +6,7 @@
   </p:sldMasterIdLst>
   <p:sldIdLst>
     <p:sldId id="256" r:id="rId2"/>
+    <p:sldId id="257" r:id="rId3"/>
   </p:sldIdLst>
   <p:sldSz cx="12192000" cy="6858000"/>
   <p:notesSz cx="6858000" cy="9144000"/>
@@ -3453,6 +3454,223 @@
 </p:sld>
 </file>
 
+<file path=ppt/slides/slide2.xml><?xml version="1.0" encoding="utf-8"?>
+<p:sld xmlns:a="http://schemas.openxmlformats.org/drawingml/2006/main" xmlns:r="http://schemas.openxmlformats.org/officeDocument/2006/relationships" xmlns:p="http://schemas.openxmlformats.org/presentationml/2006/main">
+  <p:cSld>
+    <p:spTree>
+      <p:nvGrpSpPr>
+        <p:cNvPr id="1" name="">
+          <a:extLst>
+            <a:ext uri="{FF2B5EF4-FFF2-40B4-BE49-F238E27FC236}">
+              <a16:creationId xmlns:a16="http://schemas.microsoft.com/office/drawing/2014/main" id="{0999163C-8982-FB7F-AEB6-BD6C9EA4FAB9}"/>
+            </a:ext>
+          </a:extLst>
+        </p:cNvPr>
+        <p:cNvGrpSpPr/>
+        <p:nvPr/>
+      </p:nvGrpSpPr>
+      <p:grpSpPr>
+        <a:xfrm>
+          <a:off x="0" y="0"/>
+          <a:ext cx="0" cy="0"/>
+          <a:chOff x="0" y="0"/>
+          <a:chExt cx="0" cy="0"/>
+        </a:xfrm>
+      </p:grpSpPr>
+      <p:sp>
+        <p:nvSpPr>
+          <p:cNvPr id="2" name="Rectangle 1">
+            <a:extLst>
+              <a:ext uri="{FF2B5EF4-FFF2-40B4-BE49-F238E27FC236}">
+                <a16:creationId xmlns:a16="http://schemas.microsoft.com/office/drawing/2014/main" id="{89593706-E879-F353-80C6-ECC4A00FC360}"/>
+              </a:ext>
+            </a:extLst>
+          </p:cNvPr>
+          <p:cNvSpPr/>
+          <p:nvPr/>
+        </p:nvSpPr>
+        <p:spPr>
+          <a:xfrm>
+            <a:off x="5205828" y="2471596"/>
+            <a:ext cx="1689819" cy="1629624"/>
+          </a:xfrm>
+          <a:prstGeom prst="rect">
+            <a:avLst/>
+          </a:prstGeom>
+          <a:solidFill>
+            <a:srgbClr val="36569B"/>
+          </a:solidFill>
+          <a:ln>
+            <a:noFill/>
+          </a:ln>
+        </p:spPr>
+        <p:style>
+          <a:lnRef idx="2">
+            <a:schemeClr val="accent1">
+              <a:shade val="15000"/>
+            </a:schemeClr>
+          </a:lnRef>
+          <a:fillRef idx="1">
+            <a:schemeClr val="accent1"/>
+          </a:fillRef>
+          <a:effectRef idx="0">
+            <a:schemeClr val="accent1"/>
+          </a:effectRef>
+          <a:fontRef idx="minor">
+            <a:schemeClr val="lt1"/>
+          </a:fontRef>
+        </p:style>
+        <p:txBody>
+          <a:bodyPr rtlCol="0" anchor="ctr"/>
+          <a:lstStyle/>
+          <a:p>
+            <a:pPr algn="ctr"/>
+            <a:endParaRPr lang="it-IT"/>
+          </a:p>
+        </p:txBody>
+      </p:sp>
+      <p:grpSp>
+        <p:nvGrpSpPr>
+          <p:cNvPr id="8" name="Group 7">
+            <a:extLst>
+              <a:ext uri="{FF2B5EF4-FFF2-40B4-BE49-F238E27FC236}">
+                <a16:creationId xmlns:a16="http://schemas.microsoft.com/office/drawing/2014/main" id="{137116DB-87CD-779E-A046-12FAC7705A11}"/>
+              </a:ext>
+            </a:extLst>
+          </p:cNvPr>
+          <p:cNvGrpSpPr/>
+          <p:nvPr/>
+        </p:nvGrpSpPr>
+        <p:grpSpPr>
+          <a:xfrm>
+            <a:off x="5205828" y="2710834"/>
+            <a:ext cx="1689819" cy="1228102"/>
+            <a:chOff x="5205828" y="2710834"/>
+            <a:chExt cx="1689819" cy="1228102"/>
+          </a:xfrm>
+        </p:grpSpPr>
+        <p:pic>
+          <p:nvPicPr>
+            <p:cNvPr id="7" name="Picture 6" descr="A green light on a black background&#10;&#10;AI-generated content may be incorrect.">
+              <a:extLst>
+                <a:ext uri="{FF2B5EF4-FFF2-40B4-BE49-F238E27FC236}">
+                  <a16:creationId xmlns:a16="http://schemas.microsoft.com/office/drawing/2014/main" id="{1FCBFEA6-398A-4895-17D6-6199B1E86989}"/>
+                </a:ext>
+              </a:extLst>
+            </p:cNvPr>
+            <p:cNvPicPr>
+              <a:picLocks noChangeAspect="1"/>
+            </p:cNvPicPr>
+            <p:nvPr/>
+          </p:nvPicPr>
+          <p:blipFill>
+            <a:blip r:embed="rId2">
+              <a:extLst>
+                <a:ext uri="{28A0092B-C50C-407E-A947-70E740481C1C}">
+                  <a14:useLocalDpi xmlns:a14="http://schemas.microsoft.com/office/drawing/2010/main" val="0"/>
+                </a:ext>
+              </a:extLst>
+            </a:blip>
+            <a:stretch>
+              <a:fillRect/>
+            </a:stretch>
+          </p:blipFill>
+          <p:spPr>
+            <a:xfrm>
+              <a:off x="5676599" y="2719888"/>
+              <a:ext cx="1219048" cy="1219048"/>
+            </a:xfrm>
+            <a:prstGeom prst="rect">
+              <a:avLst/>
+            </a:prstGeom>
+          </p:spPr>
+        </p:pic>
+        <p:pic>
+          <p:nvPicPr>
+            <p:cNvPr id="5" name="Picture 4" descr="A red light on a black background&#10;&#10;AI-generated content may be incorrect.">
+              <a:extLst>
+                <a:ext uri="{FF2B5EF4-FFF2-40B4-BE49-F238E27FC236}">
+                  <a16:creationId xmlns:a16="http://schemas.microsoft.com/office/drawing/2014/main" id="{345B2FD3-6BB2-E8A3-BC07-82CF599ADD2B}"/>
+                </a:ext>
+              </a:extLst>
+            </p:cNvPr>
+            <p:cNvPicPr>
+              <a:picLocks noChangeAspect="1"/>
+            </p:cNvPicPr>
+            <p:nvPr/>
+          </p:nvPicPr>
+          <p:blipFill>
+            <a:blip r:embed="rId3">
+              <a:extLst>
+                <a:ext uri="{28A0092B-C50C-407E-A947-70E740481C1C}">
+                  <a14:useLocalDpi xmlns:a14="http://schemas.microsoft.com/office/drawing/2010/main" val="0"/>
+                </a:ext>
+              </a:extLst>
+            </a:blip>
+            <a:stretch>
+              <a:fillRect/>
+            </a:stretch>
+          </p:blipFill>
+          <p:spPr>
+            <a:xfrm>
+              <a:off x="5205828" y="2710834"/>
+              <a:ext cx="1219048" cy="1219048"/>
+            </a:xfrm>
+            <a:prstGeom prst="rect">
+              <a:avLst/>
+            </a:prstGeom>
+          </p:spPr>
+        </p:pic>
+      </p:grpSp>
+      <p:pic>
+        <p:nvPicPr>
+          <p:cNvPr id="4" name="Picture 3" descr="A blue and white logo&#10;&#10;AI-generated content may be incorrect.">
+            <a:extLst>
+              <a:ext uri="{FF2B5EF4-FFF2-40B4-BE49-F238E27FC236}">
+                <a16:creationId xmlns:a16="http://schemas.microsoft.com/office/drawing/2014/main" id="{111A31B0-7104-3724-72E6-2ECD71952F6A}"/>
+              </a:ext>
+            </a:extLst>
+          </p:cNvPr>
+          <p:cNvPicPr>
+            <a:picLocks noChangeAspect="1"/>
+          </p:cNvPicPr>
+          <p:nvPr/>
+        </p:nvPicPr>
+        <p:blipFill>
+          <a:blip r:embed="rId4">
+            <a:extLst>
+              <a:ext uri="{28A0092B-C50C-407E-A947-70E740481C1C}">
+                <a14:useLocalDpi xmlns:a14="http://schemas.microsoft.com/office/drawing/2010/main" val="0"/>
+              </a:ext>
+            </a:extLst>
+          </a:blip>
+          <a:stretch>
+            <a:fillRect/>
+          </a:stretch>
+        </p:blipFill>
+        <p:spPr>
+          <a:xfrm>
+            <a:off x="890253" y="1013986"/>
+            <a:ext cx="3657607" cy="1371603"/>
+          </a:xfrm>
+          <a:prstGeom prst="rect">
+            <a:avLst/>
+          </a:prstGeom>
+        </p:spPr>
+      </p:pic>
+    </p:spTree>
+    <p:extLst>
+      <p:ext uri="{BB962C8B-B14F-4D97-AF65-F5344CB8AC3E}">
+        <p14:creationId xmlns:p14="http://schemas.microsoft.com/office/powerpoint/2010/main" val="23366799"/>
+      </p:ext>
+    </p:extLst>
+  </p:cSld>
+  <p:clrMapOvr>
+    <a:masterClrMapping/>
+  </p:clrMapOvr>
+</p:sld>
+</file>
+
 <file path=ppt/theme/theme1.xml><?xml version="1.0" encoding="utf-8"?>
 <a:theme xmlns:a="http://schemas.openxmlformats.org/drawingml/2006/main" name="Office Theme">
   <a:themeElements>

</xml_diff>